<commit_message>
finished all the details
</commit_message>
<xml_diff>
--- a/03/slide.pptx
+++ b/03/slide.pptx
@@ -5,11 +5,12 @@
     <p:sldMasterId id="2147483648" r:id="rId1"/>
   </p:sldMasterIdLst>
   <p:notesMasterIdLst>
-    <p:notesMasterId r:id="rId4"/>
+    <p:notesMasterId r:id="rId5"/>
   </p:notesMasterIdLst>
   <p:sldIdLst>
     <p:sldId id="256" r:id="rId2"/>
     <p:sldId id="258" r:id="rId3"/>
+    <p:sldId id="259" r:id="rId4"/>
   </p:sldIdLst>
   <p:sldSz cx="12192000" cy="6858000"/>
   <p:notesSz cx="6858000" cy="9144000"/>
@@ -5538,10 +5539,1062 @@
           </a:p>
         </p:txBody>
       </p:sp>
+      <p:sp>
+        <p:nvSpPr>
+          <p:cNvPr id="2" name="文本框 1">
+            <a:extLst>
+              <a:ext uri="{FF2B5EF4-FFF2-40B4-BE49-F238E27FC236}">
+                <a16:creationId xmlns:a16="http://schemas.microsoft.com/office/drawing/2014/main" id="{3135C6AB-D79D-4F46-AA06-8DFB40CBC224}"/>
+              </a:ext>
+            </a:extLst>
+          </p:cNvPr>
+          <p:cNvSpPr txBox="1"/>
+          <p:nvPr/>
+        </p:nvSpPr>
+        <p:spPr>
+          <a:xfrm>
+            <a:off x="1349358" y="1896179"/>
+            <a:ext cx="3647152" cy="369332"/>
+          </a:xfrm>
+          <a:prstGeom prst="rect">
+            <a:avLst/>
+          </a:prstGeom>
+          <a:noFill/>
+        </p:spPr>
+        <p:txBody>
+          <a:bodyPr wrap="none" rtlCol="0">
+            <a:spAutoFit/>
+          </a:bodyPr>
+          <a:lstStyle/>
+          <a:p>
+            <a:r>
+              <a:rPr lang="zh-CN" altLang="en-US" dirty="0"/>
+              <a:t>红黑树是一种自平衡的二叉搜索树</a:t>
+            </a:r>
+          </a:p>
+        </p:txBody>
+      </p:sp>
     </p:spTree>
     <p:extLst>
       <p:ext uri="{BB962C8B-B14F-4D97-AF65-F5344CB8AC3E}">
         <p14:creationId xmlns:p14="http://schemas.microsoft.com/office/powerpoint/2010/main" val="386207108"/>
+      </p:ext>
+    </p:extLst>
+  </p:cSld>
+  <p:clrMapOvr>
+    <a:masterClrMapping/>
+  </p:clrMapOvr>
+</p:sld>
+</file>
+
+<file path=ppt/slides/slide3.xml><?xml version="1.0" encoding="utf-8"?>
+<p:sld xmlns:a="http://schemas.openxmlformats.org/drawingml/2006/main" xmlns:r="http://schemas.openxmlformats.org/officeDocument/2006/relationships" xmlns:p="http://schemas.openxmlformats.org/presentationml/2006/main">
+  <p:cSld>
+    <p:spTree>
+      <p:nvGrpSpPr>
+        <p:cNvPr id="1" name=""/>
+        <p:cNvGrpSpPr/>
+        <p:nvPr/>
+      </p:nvGrpSpPr>
+      <p:grpSpPr>
+        <a:xfrm>
+          <a:off x="0" y="0"/>
+          <a:ext cx="0" cy="0"/>
+          <a:chOff x="0" y="0"/>
+          <a:chExt cx="0" cy="0"/>
+        </a:xfrm>
+      </p:grpSpPr>
+      <p:sp>
+        <p:nvSpPr>
+          <p:cNvPr id="8" name="矩形 7">
+            <a:extLst>
+              <a:ext uri="{FF2B5EF4-FFF2-40B4-BE49-F238E27FC236}">
+                <a16:creationId xmlns:a16="http://schemas.microsoft.com/office/drawing/2014/main" id="{32EB45AD-92AE-4408-9CBB-C06719C8D796}"/>
+              </a:ext>
+            </a:extLst>
+          </p:cNvPr>
+          <p:cNvSpPr/>
+          <p:nvPr/>
+        </p:nvSpPr>
+        <p:spPr>
+          <a:xfrm>
+            <a:off x="0" y="392723"/>
+            <a:ext cx="12192000" cy="240323"/>
+          </a:xfrm>
+          <a:prstGeom prst="rect">
+            <a:avLst/>
+          </a:prstGeom>
+          <a:solidFill>
+            <a:srgbClr val="8B0012"/>
+          </a:solidFill>
+          <a:ln>
+            <a:solidFill>
+              <a:srgbClr val="FF0000"/>
+            </a:solidFill>
+          </a:ln>
+        </p:spPr>
+        <p:style>
+          <a:lnRef idx="2">
+            <a:schemeClr val="accent1">
+              <a:shade val="50000"/>
+            </a:schemeClr>
+          </a:lnRef>
+          <a:fillRef idx="1">
+            <a:schemeClr val="accent1"/>
+          </a:fillRef>
+          <a:effectRef idx="0">
+            <a:schemeClr val="accent1"/>
+          </a:effectRef>
+          <a:fontRef idx="minor">
+            <a:schemeClr val="lt1"/>
+          </a:fontRef>
+        </p:style>
+        <p:txBody>
+          <a:bodyPr rtlCol="0" anchor="ctr"/>
+          <a:lstStyle/>
+          <a:p>
+            <a:pPr algn="ctr"/>
+            <a:endParaRPr lang="zh-CN" altLang="en-US" dirty="0">
+              <a:solidFill>
+                <a:srgbClr val="FF0000"/>
+              </a:solidFill>
+            </a:endParaRPr>
+          </a:p>
+        </p:txBody>
+      </p:sp>
+      <p:sp>
+        <p:nvSpPr>
+          <p:cNvPr id="11" name="矩形 10">
+            <a:extLst>
+              <a:ext uri="{FF2B5EF4-FFF2-40B4-BE49-F238E27FC236}">
+                <a16:creationId xmlns:a16="http://schemas.microsoft.com/office/drawing/2014/main" id="{E8D42275-5595-47D9-9C97-E00572AB4926}"/>
+              </a:ext>
+            </a:extLst>
+          </p:cNvPr>
+          <p:cNvSpPr/>
+          <p:nvPr/>
+        </p:nvSpPr>
+        <p:spPr>
+          <a:xfrm>
+            <a:off x="0" y="6465277"/>
+            <a:ext cx="12192000" cy="392723"/>
+          </a:xfrm>
+          <a:prstGeom prst="rect">
+            <a:avLst/>
+          </a:prstGeom>
+          <a:solidFill>
+            <a:srgbClr val="460009"/>
+          </a:solidFill>
+          <a:ln>
+            <a:solidFill>
+              <a:srgbClr val="FF0000"/>
+            </a:solidFill>
+          </a:ln>
+        </p:spPr>
+        <p:style>
+          <a:lnRef idx="2">
+            <a:schemeClr val="accent1">
+              <a:shade val="50000"/>
+            </a:schemeClr>
+          </a:lnRef>
+          <a:fillRef idx="1">
+            <a:schemeClr val="accent1"/>
+          </a:fillRef>
+          <a:effectRef idx="0">
+            <a:schemeClr val="accent1"/>
+          </a:effectRef>
+          <a:fontRef idx="minor">
+            <a:schemeClr val="lt1"/>
+          </a:fontRef>
+        </p:style>
+        <p:txBody>
+          <a:bodyPr rtlCol="0" anchor="ctr"/>
+          <a:lstStyle/>
+          <a:p>
+            <a:r>
+              <a:rPr lang="en-US" altLang="zh-CN" i="1" dirty="0"/>
+              <a:t>Web</a:t>
+            </a:r>
+            <a:r>
+              <a:rPr lang="zh-CN" altLang="en-US" i="1" dirty="0"/>
+              <a:t>课程大作业 </a:t>
+            </a:r>
+            <a:r>
+              <a:rPr lang="en-US" altLang="zh-CN" i="1" dirty="0"/>
+              <a:t>—— </a:t>
+            </a:r>
+            <a:r>
+              <a:rPr lang="zh-CN" altLang="en-US" i="1" dirty="0"/>
+              <a:t>红黑树可视化</a:t>
+            </a:r>
+            <a:endParaRPr lang="zh-CN" altLang="en-US" sz="4400" i="1" dirty="0">
+              <a:solidFill>
+                <a:schemeClr val="bg1"/>
+              </a:solidFill>
+            </a:endParaRPr>
+          </a:p>
+        </p:txBody>
+      </p:sp>
+      <p:sp>
+        <p:nvSpPr>
+          <p:cNvPr id="12" name="矩形 11">
+            <a:extLst>
+              <a:ext uri="{FF2B5EF4-FFF2-40B4-BE49-F238E27FC236}">
+                <a16:creationId xmlns:a16="http://schemas.microsoft.com/office/drawing/2014/main" id="{80C30714-03B5-4511-B969-688166456E11}"/>
+              </a:ext>
+            </a:extLst>
+          </p:cNvPr>
+          <p:cNvSpPr/>
+          <p:nvPr/>
+        </p:nvSpPr>
+        <p:spPr>
+          <a:xfrm>
+            <a:off x="0" y="6230815"/>
+            <a:ext cx="12192000" cy="240323"/>
+          </a:xfrm>
+          <a:prstGeom prst="rect">
+            <a:avLst/>
+          </a:prstGeom>
+          <a:solidFill>
+            <a:srgbClr val="8B0012"/>
+          </a:solidFill>
+          <a:ln>
+            <a:solidFill>
+              <a:srgbClr val="FF0000"/>
+            </a:solidFill>
+          </a:ln>
+        </p:spPr>
+        <p:style>
+          <a:lnRef idx="2">
+            <a:schemeClr val="accent1">
+              <a:shade val="50000"/>
+            </a:schemeClr>
+          </a:lnRef>
+          <a:fillRef idx="1">
+            <a:schemeClr val="accent1"/>
+          </a:fillRef>
+          <a:effectRef idx="0">
+            <a:schemeClr val="accent1"/>
+          </a:effectRef>
+          <a:fontRef idx="minor">
+            <a:schemeClr val="lt1"/>
+          </a:fontRef>
+        </p:style>
+        <p:txBody>
+          <a:bodyPr rtlCol="0" anchor="ctr"/>
+          <a:lstStyle/>
+          <a:p>
+            <a:r>
+              <a:rPr lang="zh-CN" altLang="en-US" sz="1600" i="1" dirty="0">
+                <a:solidFill>
+                  <a:schemeClr val="bg1"/>
+                </a:solidFill>
+              </a:rPr>
+              <a:t>陈首翱</a:t>
+            </a:r>
+            <a:r>
+              <a:rPr lang="en-US" altLang="zh-CN" sz="1600" i="1" dirty="0">
+                <a:solidFill>
+                  <a:schemeClr val="bg1"/>
+                </a:solidFill>
+              </a:rPr>
+              <a:t> @ web</a:t>
+            </a:r>
+            <a:r>
+              <a:rPr lang="zh-CN" altLang="en-US" sz="1600" i="1" dirty="0">
+                <a:solidFill>
+                  <a:schemeClr val="bg1"/>
+                </a:solidFill>
+              </a:rPr>
+              <a:t>课程报告</a:t>
+            </a:r>
+            <a:r>
+              <a:rPr lang="en-US" altLang="zh-CN" sz="1600" i="1" dirty="0">
+                <a:solidFill>
+                  <a:schemeClr val="bg1"/>
+                </a:solidFill>
+              </a:rPr>
+              <a:t>      2021.12.23</a:t>
+            </a:r>
+            <a:endParaRPr lang="zh-CN" altLang="en-US" sz="1600" i="1" dirty="0">
+              <a:solidFill>
+                <a:schemeClr val="bg1"/>
+              </a:solidFill>
+            </a:endParaRPr>
+          </a:p>
+        </p:txBody>
+      </p:sp>
+      <p:sp>
+        <p:nvSpPr>
+          <p:cNvPr id="9" name="矩形 8">
+            <a:extLst>
+              <a:ext uri="{FF2B5EF4-FFF2-40B4-BE49-F238E27FC236}">
+                <a16:creationId xmlns:a16="http://schemas.microsoft.com/office/drawing/2014/main" id="{B1D2EC5C-5B12-4AC9-A47D-A1175AF0D104}"/>
+              </a:ext>
+            </a:extLst>
+          </p:cNvPr>
+          <p:cNvSpPr/>
+          <p:nvPr/>
+        </p:nvSpPr>
+        <p:spPr>
+          <a:xfrm>
+            <a:off x="0" y="627185"/>
+            <a:ext cx="12192000" cy="554892"/>
+          </a:xfrm>
+          <a:prstGeom prst="rect">
+            <a:avLst/>
+          </a:prstGeom>
+          <a:solidFill>
+            <a:srgbClr val="B53D3D"/>
+          </a:solidFill>
+          <a:ln>
+            <a:solidFill>
+              <a:srgbClr val="FF0000"/>
+            </a:solidFill>
+          </a:ln>
+        </p:spPr>
+        <p:style>
+          <a:lnRef idx="2">
+            <a:schemeClr val="accent1">
+              <a:shade val="50000"/>
+            </a:schemeClr>
+          </a:lnRef>
+          <a:fillRef idx="1">
+            <a:schemeClr val="accent1"/>
+          </a:fillRef>
+          <a:effectRef idx="0">
+            <a:schemeClr val="accent1"/>
+          </a:effectRef>
+          <a:fontRef idx="minor">
+            <a:schemeClr val="lt1"/>
+          </a:fontRef>
+        </p:style>
+        <p:txBody>
+          <a:bodyPr rtlCol="0" anchor="ctr"/>
+          <a:lstStyle/>
+          <a:p>
+            <a:r>
+              <a:rPr lang="zh-CN" altLang="en-US" i="1" dirty="0">
+                <a:solidFill>
+                  <a:schemeClr val="bg1"/>
+                </a:solidFill>
+              </a:rPr>
+              <a:t>左旋</a:t>
+            </a:r>
+            <a:r>
+              <a:rPr lang="en-US" altLang="zh-CN" i="1" dirty="0">
+                <a:solidFill>
+                  <a:schemeClr val="bg1"/>
+                </a:solidFill>
+              </a:rPr>
+              <a:t>&amp;</a:t>
+            </a:r>
+            <a:r>
+              <a:rPr lang="zh-CN" altLang="en-US" i="1" dirty="0">
+                <a:solidFill>
+                  <a:schemeClr val="bg1"/>
+                </a:solidFill>
+              </a:rPr>
+              <a:t>右旋</a:t>
+            </a:r>
+          </a:p>
+        </p:txBody>
+      </p:sp>
+      <p:sp>
+        <p:nvSpPr>
+          <p:cNvPr id="5" name="矩形 4">
+            <a:extLst>
+              <a:ext uri="{FF2B5EF4-FFF2-40B4-BE49-F238E27FC236}">
+                <a16:creationId xmlns:a16="http://schemas.microsoft.com/office/drawing/2014/main" id="{C64E4E34-DEC9-4B5A-92A7-D0456F9CFD5D}"/>
+              </a:ext>
+            </a:extLst>
+          </p:cNvPr>
+          <p:cNvSpPr/>
+          <p:nvPr/>
+        </p:nvSpPr>
+        <p:spPr>
+          <a:xfrm>
+            <a:off x="1055077" y="2033953"/>
+            <a:ext cx="140677" cy="93785"/>
+          </a:xfrm>
+          <a:prstGeom prst="rect">
+            <a:avLst/>
+          </a:prstGeom>
+          <a:solidFill>
+            <a:srgbClr val="BA385D"/>
+          </a:solidFill>
+          <a:ln>
+            <a:solidFill>
+              <a:srgbClr val="BA385D"/>
+            </a:solidFill>
+          </a:ln>
+        </p:spPr>
+        <p:style>
+          <a:lnRef idx="2">
+            <a:schemeClr val="accent1">
+              <a:shade val="50000"/>
+            </a:schemeClr>
+          </a:lnRef>
+          <a:fillRef idx="1">
+            <a:schemeClr val="accent1"/>
+          </a:fillRef>
+          <a:effectRef idx="0">
+            <a:schemeClr val="accent1"/>
+          </a:effectRef>
+          <a:fontRef idx="minor">
+            <a:schemeClr val="lt1"/>
+          </a:fontRef>
+        </p:style>
+        <p:txBody>
+          <a:bodyPr rtlCol="0" anchor="ctr"/>
+          <a:lstStyle/>
+          <a:p>
+            <a:pPr algn="ctr"/>
+            <a:endParaRPr lang="zh-CN" altLang="en-US"/>
+          </a:p>
+        </p:txBody>
+      </p:sp>
+      <p:sp>
+        <p:nvSpPr>
+          <p:cNvPr id="10" name="椭圆 9">
+            <a:extLst>
+              <a:ext uri="{FF2B5EF4-FFF2-40B4-BE49-F238E27FC236}">
+                <a16:creationId xmlns:a16="http://schemas.microsoft.com/office/drawing/2014/main" id="{5EC4FF07-EA54-4D6C-8201-59FDFFFD94D0}"/>
+              </a:ext>
+            </a:extLst>
+          </p:cNvPr>
+          <p:cNvSpPr/>
+          <p:nvPr/>
+        </p:nvSpPr>
+        <p:spPr>
+          <a:xfrm>
+            <a:off x="1534669" y="2731074"/>
+            <a:ext cx="118911" cy="124012"/>
+          </a:xfrm>
+          <a:prstGeom prst="ellipse">
+            <a:avLst/>
+          </a:prstGeom>
+          <a:solidFill>
+            <a:srgbClr val="F20000"/>
+          </a:solidFill>
+          <a:ln>
+            <a:solidFill>
+              <a:srgbClr val="FF0000"/>
+            </a:solidFill>
+          </a:ln>
+        </p:spPr>
+        <p:style>
+          <a:lnRef idx="2">
+            <a:schemeClr val="accent1">
+              <a:shade val="50000"/>
+            </a:schemeClr>
+          </a:lnRef>
+          <a:fillRef idx="1">
+            <a:schemeClr val="accent1"/>
+          </a:fillRef>
+          <a:effectRef idx="0">
+            <a:schemeClr val="accent1"/>
+          </a:effectRef>
+          <a:fontRef idx="minor">
+            <a:schemeClr val="lt1"/>
+          </a:fontRef>
+        </p:style>
+        <p:txBody>
+          <a:bodyPr rtlCol="0" anchor="ctr"/>
+          <a:lstStyle/>
+          <a:p>
+            <a:pPr algn="ctr"/>
+            <a:endParaRPr lang="zh-CN" altLang="en-US"/>
+          </a:p>
+        </p:txBody>
+      </p:sp>
+      <p:sp>
+        <p:nvSpPr>
+          <p:cNvPr id="16" name="椭圆 15">
+            <a:extLst>
+              <a:ext uri="{FF2B5EF4-FFF2-40B4-BE49-F238E27FC236}">
+                <a16:creationId xmlns:a16="http://schemas.microsoft.com/office/drawing/2014/main" id="{45793BEF-F301-45E9-A457-B9841FD885D8}"/>
+              </a:ext>
+            </a:extLst>
+          </p:cNvPr>
+          <p:cNvSpPr/>
+          <p:nvPr/>
+        </p:nvSpPr>
+        <p:spPr>
+          <a:xfrm>
+            <a:off x="113553" y="143435"/>
+            <a:ext cx="95624" cy="103497"/>
+          </a:xfrm>
+          <a:prstGeom prst="ellipse">
+            <a:avLst/>
+          </a:prstGeom>
+          <a:solidFill>
+            <a:schemeClr val="bg1"/>
+          </a:solidFill>
+          <a:ln>
+            <a:solidFill>
+              <a:schemeClr val="bg1"/>
+            </a:solidFill>
+          </a:ln>
+        </p:spPr>
+        <p:style>
+          <a:lnRef idx="2">
+            <a:schemeClr val="accent1">
+              <a:shade val="50000"/>
+            </a:schemeClr>
+          </a:lnRef>
+          <a:fillRef idx="1">
+            <a:schemeClr val="accent1"/>
+          </a:fillRef>
+          <a:effectRef idx="0">
+            <a:schemeClr val="accent1"/>
+          </a:effectRef>
+          <a:fontRef idx="minor">
+            <a:schemeClr val="lt1"/>
+          </a:fontRef>
+        </p:style>
+        <p:txBody>
+          <a:bodyPr rtlCol="0" anchor="ctr"/>
+          <a:lstStyle/>
+          <a:p>
+            <a:pPr algn="ctr"/>
+            <a:endParaRPr lang="zh-CN" altLang="en-US"/>
+          </a:p>
+        </p:txBody>
+      </p:sp>
+      <p:sp>
+        <p:nvSpPr>
+          <p:cNvPr id="17" name="流程图: 接点 16">
+            <a:extLst>
+              <a:ext uri="{FF2B5EF4-FFF2-40B4-BE49-F238E27FC236}">
+                <a16:creationId xmlns:a16="http://schemas.microsoft.com/office/drawing/2014/main" id="{44E565C7-5B3A-4321-B035-0F3FA9387591}"/>
+              </a:ext>
+            </a:extLst>
+          </p:cNvPr>
+          <p:cNvSpPr/>
+          <p:nvPr/>
+        </p:nvSpPr>
+        <p:spPr>
+          <a:xfrm>
+            <a:off x="1639721" y="132323"/>
+            <a:ext cx="108000" cy="108000"/>
+          </a:xfrm>
+          <a:prstGeom prst="flowChartConnector">
+            <a:avLst/>
+          </a:prstGeom>
+          <a:solidFill>
+            <a:schemeClr val="bg1"/>
+          </a:solidFill>
+          <a:ln>
+            <a:solidFill>
+              <a:schemeClr val="bg1"/>
+            </a:solidFill>
+          </a:ln>
+        </p:spPr>
+        <p:style>
+          <a:lnRef idx="2">
+            <a:schemeClr val="accent1">
+              <a:shade val="50000"/>
+            </a:schemeClr>
+          </a:lnRef>
+          <a:fillRef idx="1">
+            <a:schemeClr val="accent1"/>
+          </a:fillRef>
+          <a:effectRef idx="0">
+            <a:schemeClr val="accent1"/>
+          </a:effectRef>
+          <a:fontRef idx="minor">
+            <a:schemeClr val="lt1"/>
+          </a:fontRef>
+        </p:style>
+        <p:txBody>
+          <a:bodyPr rtlCol="0" anchor="ctr"/>
+          <a:lstStyle/>
+          <a:p>
+            <a:pPr algn="ctr"/>
+            <a:endParaRPr lang="zh-CN" altLang="en-US"/>
+          </a:p>
+        </p:txBody>
+      </p:sp>
+      <p:sp>
+        <p:nvSpPr>
+          <p:cNvPr id="19" name="矩形 18">
+            <a:extLst>
+              <a:ext uri="{FF2B5EF4-FFF2-40B4-BE49-F238E27FC236}">
+                <a16:creationId xmlns:a16="http://schemas.microsoft.com/office/drawing/2014/main" id="{4B6E39CF-6CAF-4236-AEB5-94CD96D500A7}"/>
+              </a:ext>
+            </a:extLst>
+          </p:cNvPr>
+          <p:cNvSpPr/>
+          <p:nvPr/>
+        </p:nvSpPr>
+        <p:spPr>
+          <a:xfrm>
+            <a:off x="0" y="0"/>
+            <a:ext cx="12192000" cy="392723"/>
+          </a:xfrm>
+          <a:prstGeom prst="rect">
+            <a:avLst/>
+          </a:prstGeom>
+          <a:solidFill>
+            <a:srgbClr val="460009"/>
+          </a:solidFill>
+          <a:ln>
+            <a:solidFill>
+              <a:srgbClr val="FF0000"/>
+            </a:solidFill>
+          </a:ln>
+        </p:spPr>
+        <p:style>
+          <a:lnRef idx="2">
+            <a:schemeClr val="accent1">
+              <a:shade val="50000"/>
+            </a:schemeClr>
+          </a:lnRef>
+          <a:fillRef idx="1">
+            <a:schemeClr val="accent1"/>
+          </a:fillRef>
+          <a:effectRef idx="0">
+            <a:schemeClr val="accent1"/>
+          </a:effectRef>
+          <a:fontRef idx="minor">
+            <a:schemeClr val="lt1"/>
+          </a:fontRef>
+        </p:style>
+        <p:txBody>
+          <a:bodyPr rtlCol="0" anchor="ctr"/>
+          <a:lstStyle/>
+          <a:p>
+            <a:endParaRPr lang="zh-CN" altLang="en-US" sz="800" dirty="0">
+              <a:solidFill>
+                <a:schemeClr val="bg1"/>
+              </a:solidFill>
+            </a:endParaRPr>
+          </a:p>
+        </p:txBody>
+      </p:sp>
+      <p:sp>
+        <p:nvSpPr>
+          <p:cNvPr id="20" name="流程图: 接点 19">
+            <a:extLst>
+              <a:ext uri="{FF2B5EF4-FFF2-40B4-BE49-F238E27FC236}">
+                <a16:creationId xmlns:a16="http://schemas.microsoft.com/office/drawing/2014/main" id="{C922A49D-1977-4BE4-A52B-E120832E2CB6}"/>
+              </a:ext>
+            </a:extLst>
+          </p:cNvPr>
+          <p:cNvSpPr/>
+          <p:nvPr/>
+        </p:nvSpPr>
+        <p:spPr>
+          <a:xfrm>
+            <a:off x="214712" y="142362"/>
+            <a:ext cx="108000" cy="108000"/>
+          </a:xfrm>
+          <a:prstGeom prst="flowChartConnector">
+            <a:avLst/>
+          </a:prstGeom>
+          <a:solidFill>
+            <a:schemeClr val="bg1"/>
+          </a:solidFill>
+          <a:ln>
+            <a:solidFill>
+              <a:schemeClr val="bg1"/>
+            </a:solidFill>
+          </a:ln>
+        </p:spPr>
+        <p:style>
+          <a:lnRef idx="2">
+            <a:schemeClr val="accent1">
+              <a:shade val="50000"/>
+            </a:schemeClr>
+          </a:lnRef>
+          <a:fillRef idx="1">
+            <a:schemeClr val="accent1"/>
+          </a:fillRef>
+          <a:effectRef idx="0">
+            <a:schemeClr val="accent1"/>
+          </a:effectRef>
+          <a:fontRef idx="minor">
+            <a:schemeClr val="lt1"/>
+          </a:fontRef>
+        </p:style>
+        <p:txBody>
+          <a:bodyPr rtlCol="0" anchor="ctr"/>
+          <a:lstStyle/>
+          <a:p>
+            <a:pPr algn="ctr"/>
+            <a:endParaRPr lang="zh-CN" altLang="en-US"/>
+          </a:p>
+        </p:txBody>
+      </p:sp>
+      <p:sp>
+        <p:nvSpPr>
+          <p:cNvPr id="21" name="流程图: 接点 20">
+            <a:extLst>
+              <a:ext uri="{FF2B5EF4-FFF2-40B4-BE49-F238E27FC236}">
+                <a16:creationId xmlns:a16="http://schemas.microsoft.com/office/drawing/2014/main" id="{0E0FFAE2-C28B-4B9A-80AB-528CC75DAE7C}"/>
+              </a:ext>
+            </a:extLst>
+          </p:cNvPr>
+          <p:cNvSpPr/>
+          <p:nvPr/>
+        </p:nvSpPr>
+        <p:spPr>
+          <a:xfrm>
+            <a:off x="362312" y="142361"/>
+            <a:ext cx="108000" cy="108000"/>
+          </a:xfrm>
+          <a:prstGeom prst="flowChartConnector">
+            <a:avLst/>
+          </a:prstGeom>
+          <a:solidFill>
+            <a:srgbClr val="460009"/>
+          </a:solidFill>
+          <a:ln>
+            <a:solidFill>
+              <a:schemeClr val="bg1"/>
+            </a:solidFill>
+          </a:ln>
+        </p:spPr>
+        <p:style>
+          <a:lnRef idx="2">
+            <a:schemeClr val="accent1">
+              <a:shade val="50000"/>
+            </a:schemeClr>
+          </a:lnRef>
+          <a:fillRef idx="1">
+            <a:schemeClr val="accent1"/>
+          </a:fillRef>
+          <a:effectRef idx="0">
+            <a:schemeClr val="accent1"/>
+          </a:effectRef>
+          <a:fontRef idx="minor">
+            <a:schemeClr val="lt1"/>
+          </a:fontRef>
+        </p:style>
+        <p:txBody>
+          <a:bodyPr rtlCol="0" anchor="ctr"/>
+          <a:lstStyle/>
+          <a:p>
+            <a:pPr algn="ctr"/>
+            <a:endParaRPr lang="zh-CN" altLang="en-US"/>
+          </a:p>
+        </p:txBody>
+      </p:sp>
+      <p:sp>
+        <p:nvSpPr>
+          <p:cNvPr id="22" name="流程图: 接点 21">
+            <a:extLst>
+              <a:ext uri="{FF2B5EF4-FFF2-40B4-BE49-F238E27FC236}">
+                <a16:creationId xmlns:a16="http://schemas.microsoft.com/office/drawing/2014/main" id="{6486184B-9DFF-4A00-A61F-011E1DF81DA7}"/>
+              </a:ext>
+            </a:extLst>
+          </p:cNvPr>
+          <p:cNvSpPr/>
+          <p:nvPr/>
+        </p:nvSpPr>
+        <p:spPr>
+          <a:xfrm>
+            <a:off x="509912" y="142361"/>
+            <a:ext cx="108000" cy="108000"/>
+          </a:xfrm>
+          <a:prstGeom prst="flowChartConnector">
+            <a:avLst/>
+          </a:prstGeom>
+          <a:solidFill>
+            <a:srgbClr val="460009"/>
+          </a:solidFill>
+          <a:ln>
+            <a:solidFill>
+              <a:schemeClr val="bg1"/>
+            </a:solidFill>
+          </a:ln>
+        </p:spPr>
+        <p:style>
+          <a:lnRef idx="2">
+            <a:schemeClr val="accent1">
+              <a:shade val="50000"/>
+            </a:schemeClr>
+          </a:lnRef>
+          <a:fillRef idx="1">
+            <a:schemeClr val="accent1"/>
+          </a:fillRef>
+          <a:effectRef idx="0">
+            <a:schemeClr val="accent1"/>
+          </a:effectRef>
+          <a:fontRef idx="minor">
+            <a:schemeClr val="lt1"/>
+          </a:fontRef>
+        </p:style>
+        <p:txBody>
+          <a:bodyPr rtlCol="0" anchor="ctr"/>
+          <a:lstStyle/>
+          <a:p>
+            <a:pPr algn="ctr"/>
+            <a:endParaRPr lang="zh-CN" altLang="en-US"/>
+          </a:p>
+        </p:txBody>
+      </p:sp>
+      <p:sp>
+        <p:nvSpPr>
+          <p:cNvPr id="23" name="流程图: 接点 22">
+            <a:extLst>
+              <a:ext uri="{FF2B5EF4-FFF2-40B4-BE49-F238E27FC236}">
+                <a16:creationId xmlns:a16="http://schemas.microsoft.com/office/drawing/2014/main" id="{9F77FCE4-D267-4F13-8889-7608F4820003}"/>
+              </a:ext>
+            </a:extLst>
+          </p:cNvPr>
+          <p:cNvSpPr/>
+          <p:nvPr/>
+        </p:nvSpPr>
+        <p:spPr>
+          <a:xfrm>
+            <a:off x="657512" y="142361"/>
+            <a:ext cx="108000" cy="108000"/>
+          </a:xfrm>
+          <a:prstGeom prst="flowChartConnector">
+            <a:avLst/>
+          </a:prstGeom>
+          <a:solidFill>
+            <a:srgbClr val="460009"/>
+          </a:solidFill>
+          <a:ln>
+            <a:solidFill>
+              <a:schemeClr val="bg1"/>
+            </a:solidFill>
+          </a:ln>
+        </p:spPr>
+        <p:style>
+          <a:lnRef idx="2">
+            <a:schemeClr val="accent1">
+              <a:shade val="50000"/>
+            </a:schemeClr>
+          </a:lnRef>
+          <a:fillRef idx="1">
+            <a:schemeClr val="accent1"/>
+          </a:fillRef>
+          <a:effectRef idx="0">
+            <a:schemeClr val="accent1"/>
+          </a:effectRef>
+          <a:fontRef idx="minor">
+            <a:schemeClr val="lt1"/>
+          </a:fontRef>
+        </p:style>
+        <p:txBody>
+          <a:bodyPr rtlCol="0" anchor="ctr"/>
+          <a:lstStyle/>
+          <a:p>
+            <a:pPr algn="ctr"/>
+            <a:endParaRPr lang="zh-CN" altLang="en-US"/>
+          </a:p>
+        </p:txBody>
+      </p:sp>
+      <p:sp>
+        <p:nvSpPr>
+          <p:cNvPr id="24" name="流程图: 接点 23">
+            <a:extLst>
+              <a:ext uri="{FF2B5EF4-FFF2-40B4-BE49-F238E27FC236}">
+                <a16:creationId xmlns:a16="http://schemas.microsoft.com/office/drawing/2014/main" id="{43F7E76C-F362-45D9-A2F4-06B6171F2BCB}"/>
+              </a:ext>
+            </a:extLst>
+          </p:cNvPr>
+          <p:cNvSpPr/>
+          <p:nvPr/>
+        </p:nvSpPr>
+        <p:spPr>
+          <a:xfrm>
+            <a:off x="805112" y="142361"/>
+            <a:ext cx="108000" cy="108000"/>
+          </a:xfrm>
+          <a:prstGeom prst="flowChartConnector">
+            <a:avLst/>
+          </a:prstGeom>
+          <a:solidFill>
+            <a:srgbClr val="460009"/>
+          </a:solidFill>
+          <a:ln>
+            <a:solidFill>
+              <a:schemeClr val="bg1"/>
+            </a:solidFill>
+          </a:ln>
+        </p:spPr>
+        <p:style>
+          <a:lnRef idx="2">
+            <a:schemeClr val="accent1">
+              <a:shade val="50000"/>
+            </a:schemeClr>
+          </a:lnRef>
+          <a:fillRef idx="1">
+            <a:schemeClr val="accent1"/>
+          </a:fillRef>
+          <a:effectRef idx="0">
+            <a:schemeClr val="accent1"/>
+          </a:effectRef>
+          <a:fontRef idx="minor">
+            <a:schemeClr val="lt1"/>
+          </a:fontRef>
+        </p:style>
+        <p:txBody>
+          <a:bodyPr rtlCol="0" anchor="ctr"/>
+          <a:lstStyle/>
+          <a:p>
+            <a:pPr algn="ctr"/>
+            <a:endParaRPr lang="zh-CN" altLang="en-US"/>
+          </a:p>
+        </p:txBody>
+      </p:sp>
+      <p:sp>
+        <p:nvSpPr>
+          <p:cNvPr id="25" name="流程图: 接点 24">
+            <a:extLst>
+              <a:ext uri="{FF2B5EF4-FFF2-40B4-BE49-F238E27FC236}">
+                <a16:creationId xmlns:a16="http://schemas.microsoft.com/office/drawing/2014/main" id="{10233A9F-47D8-45DE-AC24-15B71EC0669C}"/>
+              </a:ext>
+            </a:extLst>
+          </p:cNvPr>
+          <p:cNvSpPr/>
+          <p:nvPr/>
+        </p:nvSpPr>
+        <p:spPr>
+          <a:xfrm>
+            <a:off x="952712" y="142361"/>
+            <a:ext cx="108000" cy="108000"/>
+          </a:xfrm>
+          <a:prstGeom prst="flowChartConnector">
+            <a:avLst/>
+          </a:prstGeom>
+          <a:solidFill>
+            <a:srgbClr val="460009"/>
+          </a:solidFill>
+          <a:ln>
+            <a:solidFill>
+              <a:schemeClr val="bg1"/>
+            </a:solidFill>
+          </a:ln>
+        </p:spPr>
+        <p:style>
+          <a:lnRef idx="2">
+            <a:schemeClr val="accent1">
+              <a:shade val="50000"/>
+            </a:schemeClr>
+          </a:lnRef>
+          <a:fillRef idx="1">
+            <a:schemeClr val="accent1"/>
+          </a:fillRef>
+          <a:effectRef idx="0">
+            <a:schemeClr val="accent1"/>
+          </a:effectRef>
+          <a:fontRef idx="minor">
+            <a:schemeClr val="lt1"/>
+          </a:fontRef>
+        </p:style>
+        <p:txBody>
+          <a:bodyPr rtlCol="0" anchor="ctr"/>
+          <a:lstStyle/>
+          <a:p>
+            <a:pPr algn="ctr"/>
+            <a:endParaRPr lang="zh-CN" altLang="en-US"/>
+          </a:p>
+        </p:txBody>
+      </p:sp>
+      <p:sp>
+        <p:nvSpPr>
+          <p:cNvPr id="26" name="流程图: 接点 25">
+            <a:extLst>
+              <a:ext uri="{FF2B5EF4-FFF2-40B4-BE49-F238E27FC236}">
+                <a16:creationId xmlns:a16="http://schemas.microsoft.com/office/drawing/2014/main" id="{101452D9-E881-44E7-9A25-EB3B700FFAFD}"/>
+              </a:ext>
+            </a:extLst>
+          </p:cNvPr>
+          <p:cNvSpPr/>
+          <p:nvPr/>
+        </p:nvSpPr>
+        <p:spPr>
+          <a:xfrm>
+            <a:off x="1100312" y="142361"/>
+            <a:ext cx="108000" cy="108000"/>
+          </a:xfrm>
+          <a:prstGeom prst="flowChartConnector">
+            <a:avLst/>
+          </a:prstGeom>
+          <a:solidFill>
+            <a:srgbClr val="460009"/>
+          </a:solidFill>
+          <a:ln>
+            <a:solidFill>
+              <a:schemeClr val="bg1"/>
+            </a:solidFill>
+          </a:ln>
+        </p:spPr>
+        <p:style>
+          <a:lnRef idx="2">
+            <a:schemeClr val="accent1">
+              <a:shade val="50000"/>
+            </a:schemeClr>
+          </a:lnRef>
+          <a:fillRef idx="1">
+            <a:schemeClr val="accent1"/>
+          </a:fillRef>
+          <a:effectRef idx="0">
+            <a:schemeClr val="accent1"/>
+          </a:effectRef>
+          <a:fontRef idx="minor">
+            <a:schemeClr val="lt1"/>
+          </a:fontRef>
+        </p:style>
+        <p:txBody>
+          <a:bodyPr rtlCol="0" anchor="ctr"/>
+          <a:lstStyle/>
+          <a:p>
+            <a:pPr algn="ctr"/>
+            <a:endParaRPr lang="zh-CN" altLang="en-US"/>
+          </a:p>
+        </p:txBody>
+      </p:sp>
+      <p:sp>
+        <p:nvSpPr>
+          <p:cNvPr id="2" name="文本框 1">
+            <a:extLst>
+              <a:ext uri="{FF2B5EF4-FFF2-40B4-BE49-F238E27FC236}">
+                <a16:creationId xmlns:a16="http://schemas.microsoft.com/office/drawing/2014/main" id="{3135C6AB-D79D-4F46-AA06-8DFB40CBC224}"/>
+              </a:ext>
+            </a:extLst>
+          </p:cNvPr>
+          <p:cNvSpPr txBox="1"/>
+          <p:nvPr/>
+        </p:nvSpPr>
+        <p:spPr>
+          <a:xfrm>
+            <a:off x="1349358" y="1896179"/>
+            <a:ext cx="3055645" cy="369332"/>
+          </a:xfrm>
+          <a:prstGeom prst="rect">
+            <a:avLst/>
+          </a:prstGeom>
+          <a:noFill/>
+        </p:spPr>
+        <p:txBody>
+          <a:bodyPr wrap="none" rtlCol="0">
+            <a:spAutoFit/>
+          </a:bodyPr>
+          <a:lstStyle/>
+          <a:p>
+            <a:r>
+              <a:rPr lang="zh-CN" altLang="en-US" dirty="0"/>
+              <a:t>红黑树是如何实现自平衡的</a:t>
+            </a:r>
+            <a:r>
+              <a:rPr lang="en-US" altLang="zh-CN" dirty="0"/>
+              <a:t>?</a:t>
+            </a:r>
+            <a:endParaRPr lang="zh-CN" altLang="en-US" dirty="0"/>
+          </a:p>
+        </p:txBody>
+      </p:sp>
+    </p:spTree>
+    <p:extLst>
+      <p:ext uri="{BB962C8B-B14F-4D97-AF65-F5344CB8AC3E}">
+        <p14:creationId xmlns:p14="http://schemas.microsoft.com/office/powerpoint/2010/main" val="864034653"/>
       </p:ext>
     </p:extLst>
   </p:cSld>

</xml_diff>